<commit_message>
2018 Updated What's new in 2018
</commit_message>
<xml_diff>
--- a/docs/presentations/Sage300SDK_2018.0WebSDKOverview.pptx
+++ b/docs/presentations/Sage300SDK_2018.0WebSDKOverview.pptx
@@ -211,7 +211,7 @@
           <a:p>
             <a:fld id="{F8DE098C-C2B2-472C-9728-F51906A9149D}" type="datetimeFigureOut">
               <a:rPr lang="en-US" smtClean="0"/>
-              <a:t>6/1/2017</a:t>
+              <a:t>7/12/2017</a:t>
             </a:fld>
             <a:endParaRPr lang="en-US"/>
           </a:p>
@@ -1984,7 +1984,7 @@
                 </a:solidFill>
               </a:rPr>
               <a:pPr/>
-              <a:t>2017/06/01</a:t>
+              <a:t>2017/07/12</a:t>
             </a:fld>
             <a:endParaRPr lang="en-US">
               <a:solidFill>
@@ -2289,7 +2289,7 @@
                 </a:solidFill>
               </a:rPr>
               <a:pPr/>
-              <a:t>2017/06/01</a:t>
+              <a:t>2017/07/12</a:t>
             </a:fld>
             <a:endParaRPr lang="en-US">
               <a:solidFill>
@@ -2526,7 +2526,7 @@
             <a:fld id="{EE1C84F4-270C-2249-89D9-A705BDADDAAB}" type="datetime1">
               <a:rPr lang="en-ZA" smtClean="0"/>
               <a:pPr/>
-              <a:t>2017/06/01</a:t>
+              <a:t>2017/07/12</a:t>
             </a:fld>
             <a:endParaRPr lang="en-US"/>
           </a:p>
@@ -2865,7 +2865,7 @@
             <a:fld id="{2AE6851E-022E-D141-8BE0-1745E9557F71}" type="datetime1">
               <a:rPr lang="en-ZA" smtClean="0"/>
               <a:pPr/>
-              <a:t>2017/06/01</a:t>
+              <a:t>2017/07/12</a:t>
             </a:fld>
             <a:endParaRPr lang="en-US"/>
           </a:p>
@@ -3363,71 +3363,6 @@
       </p:grpSpPr>
       <p:sp>
         <p:nvSpPr>
-          <p:cNvPr id="2" name="Rectangle 1"/>
-          <p:cNvSpPr/>
-          <p:nvPr/>
-        </p:nvSpPr>
-        <p:spPr>
-          <a:xfrm>
-            <a:off x="1149073" y="689186"/>
-            <a:ext cx="8589159" cy="1446550"/>
-          </a:xfrm>
-          <a:prstGeom prst="rect">
-            <a:avLst/>
-          </a:prstGeom>
-          <a:noFill/>
-        </p:spPr>
-        <p:txBody>
-          <a:bodyPr wrap="square" lIns="91440" tIns="45720" rIns="91440" bIns="45720">
-            <a:spAutoFit/>
-          </a:bodyPr>
-          <a:lstStyle/>
-          <a:p>
-            <a:pPr algn="ctr"/>
-            <a:r>
-              <a:rPr lang="en-US" sz="8800" b="1" dirty="0">
-                <a:ln w="9525">
-                  <a:solidFill>
-                    <a:schemeClr val="bg1"/>
-                  </a:solidFill>
-                  <a:prstDash val="solid"/>
-                </a:ln>
-                <a:solidFill>
-                  <a:srgbClr val="FF0000"/>
-                </a:solidFill>
-                <a:effectLst>
-                  <a:outerShdw blurRad="12700" dist="38100" dir="2700000" algn="tl" rotWithShape="0">
-                    <a:schemeClr val="bg1">
-                      <a:lumMod val="50000"/>
-                    </a:schemeClr>
-                  </a:outerShdw>
-                </a:effectLst>
-              </a:rPr>
-              <a:t>Preliminary</a:t>
-            </a:r>
-            <a:endParaRPr lang="en-US" sz="8800" b="1" cap="none" spc="0" dirty="0">
-              <a:ln w="9525">
-                <a:solidFill>
-                  <a:schemeClr val="bg1"/>
-                </a:solidFill>
-                <a:prstDash val="solid"/>
-              </a:ln>
-              <a:solidFill>
-                <a:srgbClr val="FF0000"/>
-              </a:solidFill>
-              <a:effectLst>
-                <a:outerShdw blurRad="12700" dist="38100" dir="2700000" algn="tl" rotWithShape="0">
-                  <a:schemeClr val="bg1">
-                    <a:lumMod val="50000"/>
-                  </a:schemeClr>
-                </a:outerShdw>
-              </a:effectLst>
-            </a:endParaRPr>
-          </a:p>
-        </p:txBody>
-      </p:sp>
-      <p:sp>
-        <p:nvSpPr>
           <p:cNvPr id="3" name="Title 1"/>
           <p:cNvSpPr txBox="1">
             <a:spLocks/>
@@ -3502,7 +3437,7 @@
           <a:p>
             <a:r>
               <a:rPr lang="en-US" dirty="0"/>
-              <a:t>June 2017</a:t>
+              <a:t>July 2017</a:t>
             </a:r>
           </a:p>
         </p:txBody>
@@ -3554,7 +3489,7 @@
           <a:p>
             <a:r>
               <a:rPr lang="en-US" dirty="0"/>
-              <a:t>More Tentative Commits</a:t>
+              <a:t>PDB Files for Common and Core Components</a:t>
             </a:r>
           </a:p>
         </p:txBody>
@@ -3593,68 +3528,10 @@
             </a:r>
           </a:p>
           <a:p>
-            <a:pPr lvl="1"/>
-            <a:r>
-              <a:rPr lang="en-US" sz="2400" dirty="0"/>
-              <a:t>Minify JavaScript code</a:t>
-            </a:r>
-          </a:p>
-          <a:p>
             <a:pPr lvl="2"/>
             <a:r>
               <a:rPr lang="en-US" sz="2000" dirty="0"/>
-              <a:t>If Sage minifies code, same tool will be provided to allow partner to minify</a:t>
-            </a:r>
-          </a:p>
-          <a:p>
-            <a:pPr lvl="2"/>
-            <a:endParaRPr lang="en-US" sz="2000" dirty="0"/>
-          </a:p>
-        </p:txBody>
-      </p:sp>
-      <p:sp>
-        <p:nvSpPr>
-          <p:cNvPr id="6" name="Rectangle 5"/>
-          <p:cNvSpPr/>
-          <p:nvPr/>
-        </p:nvSpPr>
-        <p:spPr>
-          <a:xfrm>
-            <a:off x="814515" y="5686848"/>
-            <a:ext cx="10961473" cy="923330"/>
-          </a:xfrm>
-          <a:prstGeom prst="rect">
-            <a:avLst/>
-          </a:prstGeom>
-          <a:noFill/>
-        </p:spPr>
-        <p:txBody>
-          <a:bodyPr wrap="square" lIns="91440" tIns="45720" rIns="91440" bIns="45720">
-            <a:spAutoFit/>
-          </a:bodyPr>
-          <a:lstStyle/>
-          <a:p>
-            <a:pPr algn="ctr"/>
-            <a:r>
-              <a:rPr lang="en-US" sz="5400" b="1" cap="none" spc="0" dirty="0">
-                <a:ln w="9525">
-                  <a:solidFill>
-                    <a:schemeClr val="bg1"/>
-                  </a:solidFill>
-                  <a:prstDash val="solid"/>
-                </a:ln>
-                <a:solidFill>
-                  <a:srgbClr val="FF0000"/>
-                </a:solidFill>
-                <a:effectLst>
-                  <a:outerShdw blurRad="12700" dist="38100" dir="2700000" algn="tl" rotWithShape="0">
-                    <a:schemeClr val="bg1">
-                      <a:lumMod val="50000"/>
-                    </a:schemeClr>
-                  </a:outerShdw>
-                </a:effectLst>
-              </a:rPr>
-              <a:t>Tentative</a:t>
+              <a:t>Available via DPP Download</a:t>
             </a:r>
           </a:p>
         </p:txBody>
@@ -3751,7 +3628,14 @@
             <a:pPr lvl="2"/>
             <a:r>
               <a:rPr lang="en-US" sz="2000" dirty="0"/>
-              <a:t>2017.2 is available in “master” branch</a:t>
+              <a:t>2018.0 is available in the “master” branch</a:t>
+            </a:r>
+          </a:p>
+          <a:p>
+            <a:pPr lvl="2"/>
+            <a:r>
+              <a:rPr lang="en-US" sz="2000" dirty="0"/>
+              <a:t>2017.2 is available in the “release-2017.2” branch (archive)</a:t>
             </a:r>
           </a:p>
           <a:p>
@@ -3772,77 +3656,12 @@
             <a:pPr lvl="2"/>
             <a:r>
               <a:rPr lang="en-US" sz="2000" dirty="0"/>
-              <a:t>2018.0 is available in the “develop” branch (in-progress)</a:t>
+              <a:t>2018.1 is available in the “develop” branch (in-progress)</a:t>
             </a:r>
           </a:p>
           <a:p>
             <a:pPr lvl="2"/>
             <a:endParaRPr lang="en-US" dirty="0"/>
-          </a:p>
-        </p:txBody>
-      </p:sp>
-      <p:sp>
-        <p:nvSpPr>
-          <p:cNvPr id="4" name="Rectangle 3"/>
-          <p:cNvSpPr/>
-          <p:nvPr/>
-        </p:nvSpPr>
-        <p:spPr>
-          <a:xfrm>
-            <a:off x="110180" y="4661237"/>
-            <a:ext cx="10961473" cy="923330"/>
-          </a:xfrm>
-          <a:prstGeom prst="rect">
-            <a:avLst/>
-          </a:prstGeom>
-          <a:noFill/>
-        </p:spPr>
-        <p:txBody>
-          <a:bodyPr wrap="square" lIns="91440" tIns="45720" rIns="91440" bIns="45720">
-            <a:spAutoFit/>
-          </a:bodyPr>
-          <a:lstStyle/>
-          <a:p>
-            <a:pPr algn="ctr"/>
-            <a:r>
-              <a:rPr lang="en-US" sz="5400" b="1" dirty="0">
-                <a:ln w="9525">
-                  <a:solidFill>
-                    <a:schemeClr val="bg1"/>
-                  </a:solidFill>
-                  <a:prstDash val="solid"/>
-                </a:ln>
-                <a:solidFill>
-                  <a:srgbClr val="FF0000"/>
-                </a:solidFill>
-                <a:effectLst>
-                  <a:outerShdw blurRad="12700" dist="38100" dir="2700000" algn="tl" rotWithShape="0">
-                    <a:schemeClr val="bg1">
-                      <a:lumMod val="50000"/>
-                    </a:schemeClr>
-                  </a:outerShdw>
-                </a:effectLst>
-              </a:rPr>
-              <a:t>Current Branches</a:t>
-            </a:r>
-            <a:endParaRPr lang="en-US" sz="5400" b="1" cap="none" spc="0" dirty="0">
-              <a:ln w="9525">
-                <a:solidFill>
-                  <a:schemeClr val="bg1"/>
-                </a:solidFill>
-                <a:prstDash val="solid"/>
-              </a:ln>
-              <a:solidFill>
-                <a:srgbClr val="FF0000"/>
-              </a:solidFill>
-              <a:effectLst>
-                <a:outerShdw blurRad="12700" dist="38100" dir="2700000" algn="tl" rotWithShape="0">
-                  <a:schemeClr val="bg1">
-                    <a:lumMod val="50000"/>
-                  </a:schemeClr>
-                </a:outerShdw>
-              </a:effectLst>
-            </a:endParaRPr>
           </a:p>
         </p:txBody>
       </p:sp>
@@ -4161,8 +3980,43 @@
               <a:t>XML Documentation Checkbox now selected by default</a:t>
             </a:r>
           </a:p>
-        </p:txBody>
-      </p:sp>
+          <a:p>
+            <a:pPr lvl="1"/>
+            <a:r>
+              <a:rPr lang="en-US" sz="2400" dirty="0"/>
+              <a:t>Updated User Interface</a:t>
+            </a:r>
+          </a:p>
+        </p:txBody>
+      </p:sp>
+      <p:pic>
+        <p:nvPicPr>
+          <p:cNvPr id="4" name="Picture 3">
+            <a:extLst>
+              <a:ext uri="{FF2B5EF4-FFF2-40B4-BE49-F238E27FC236}">
+                <a16:creationId xmlns:a16="http://schemas.microsoft.com/office/drawing/2014/main" id="{0E746CB3-8CA3-4B82-8E40-5E24A4064096}"/>
+              </a:ext>
+            </a:extLst>
+          </p:cNvPr>
+          <p:cNvPicPr/>
+          <p:nvPr/>
+        </p:nvPicPr>
+        <p:blipFill>
+          <a:blip r:embed="rId3"/>
+          <a:stretch>
+            <a:fillRect/>
+          </a:stretch>
+        </p:blipFill>
+        <p:spPr>
+          <a:xfrm>
+            <a:off x="4371660" y="2573319"/>
+            <a:ext cx="5696788" cy="4028448"/>
+          </a:xfrm>
+          <a:prstGeom prst="rect">
+            <a:avLst/>
+          </a:prstGeom>
+        </p:spPr>
+      </p:pic>
     </p:spTree>
     <p:extLst>
       <p:ext uri="{BB962C8B-B14F-4D97-AF65-F5344CB8AC3E}">
@@ -4228,7 +4082,7 @@
         <p:spPr>
           <a:xfrm>
             <a:off x="466025" y="1366944"/>
-            <a:ext cx="8504980" cy="5008456"/>
+            <a:ext cx="5643373" cy="5008456"/>
           </a:xfrm>
         </p:spPr>
         <p:txBody>
@@ -4253,18 +4107,7 @@
             </a:r>
             <a:r>
               <a:rPr lang="en-US" sz="2400" dirty="0"/>
-              <a:t> file</a:t>
-            </a:r>
-          </a:p>
-          <a:p>
-            <a:pPr lvl="2"/>
-            <a:r>
-              <a:rPr lang="en-US" sz="2000" dirty="0" err="1"/>
-              <a:t>Accpac.Advantage</a:t>
-            </a:r>
-            <a:r>
-              <a:rPr lang="en-US" sz="2000" dirty="0"/>
-              <a:t> now 6.5.0.0</a:t>
+              <a:t> file to 6.5.0.0</a:t>
             </a:r>
           </a:p>
           <a:p>
@@ -4285,7 +4128,7 @@
             <a:pPr lvl="1"/>
             <a:r>
               <a:rPr lang="en-US" sz="2400" dirty="0"/>
-              <a:t>Misc. Corrections</a:t>
+              <a:t>Updated User Interface</a:t>
             </a:r>
           </a:p>
           <a:p>
@@ -4294,6 +4137,34 @@
           </a:p>
         </p:txBody>
       </p:sp>
+      <p:pic>
+        <p:nvPicPr>
+          <p:cNvPr id="4" name="Picture 3">
+            <a:extLst>
+              <a:ext uri="{FF2B5EF4-FFF2-40B4-BE49-F238E27FC236}">
+                <a16:creationId xmlns:a16="http://schemas.microsoft.com/office/drawing/2014/main" id="{6FED5716-0F82-423E-B5FE-2D025D10F79C}"/>
+              </a:ext>
+            </a:extLst>
+          </p:cNvPr>
+          <p:cNvPicPr/>
+          <p:nvPr/>
+        </p:nvPicPr>
+        <p:blipFill>
+          <a:blip r:embed="rId3"/>
+          <a:stretch>
+            <a:fillRect/>
+          </a:stretch>
+        </p:blipFill>
+        <p:spPr>
+          <a:xfrm>
+            <a:off x="6582297" y="1080347"/>
+            <a:ext cx="4533900" cy="5581650"/>
+          </a:xfrm>
+          <a:prstGeom prst="rect">
+            <a:avLst/>
+          </a:prstGeom>
+        </p:spPr>
+      </p:pic>
     </p:spTree>
     <p:extLst>
       <p:ext uri="{BB962C8B-B14F-4D97-AF65-F5344CB8AC3E}">
@@ -4436,11 +4307,24 @@
               <a:t>Pagination TODO Comments</a:t>
             </a:r>
           </a:p>
+          <a:p>
+            <a:pPr lvl="2"/>
+            <a:r>
+              <a:rPr lang="en-US" sz="2000" dirty="0"/>
+              <a:t>Updated User Interface</a:t>
+            </a:r>
+          </a:p>
         </p:txBody>
       </p:sp>
       <p:pic>
         <p:nvPicPr>
-          <p:cNvPr id="2" name="Picture 1"/>
+          <p:cNvPr id="3" name="Picture 2">
+            <a:extLst>
+              <a:ext uri="{FF2B5EF4-FFF2-40B4-BE49-F238E27FC236}">
+                <a16:creationId xmlns:a16="http://schemas.microsoft.com/office/drawing/2014/main" id="{913C7682-61FD-415F-9B88-F9C7AF4BBAF1}"/>
+              </a:ext>
+            </a:extLst>
+          </p:cNvPr>
           <p:cNvPicPr>
             <a:picLocks noChangeAspect="1"/>
           </p:cNvPicPr>
@@ -4454,7 +4338,7 @@
         </p:blipFill>
         <p:spPr>
           <a:xfrm>
-            <a:off x="6354136" y="976269"/>
+            <a:off x="6823459" y="1366944"/>
             <a:ext cx="4533900" cy="5257800"/>
           </a:xfrm>
           <a:prstGeom prst="rect">
@@ -4462,53 +4346,6 @@
           </a:prstGeom>
         </p:spPr>
       </p:pic>
-      <p:sp>
-        <p:nvSpPr>
-          <p:cNvPr id="5" name="Rectangle 4"/>
-          <p:cNvSpPr/>
-          <p:nvPr/>
-        </p:nvSpPr>
-        <p:spPr>
-          <a:xfrm rot="20032672">
-            <a:off x="5991997" y="3027839"/>
-            <a:ext cx="4717580" cy="923330"/>
-          </a:xfrm>
-          <a:prstGeom prst="rect">
-            <a:avLst/>
-          </a:prstGeom>
-          <a:noFill/>
-        </p:spPr>
-        <p:txBody>
-          <a:bodyPr wrap="square" lIns="91440" tIns="45720" rIns="91440" bIns="45720">
-            <a:spAutoFit/>
-          </a:bodyPr>
-          <a:lstStyle/>
-          <a:p>
-            <a:pPr algn="ctr"/>
-            <a:r>
-              <a:rPr lang="en-US" sz="5400" b="1" cap="none" spc="0" dirty="0">
-                <a:ln w="9525">
-                  <a:solidFill>
-                    <a:schemeClr val="bg1"/>
-                  </a:solidFill>
-                  <a:prstDash val="solid"/>
-                </a:ln>
-                <a:solidFill>
-                  <a:srgbClr val="FF0000"/>
-                </a:solidFill>
-                <a:effectLst>
-                  <a:outerShdw blurRad="12700" dist="38100" dir="2700000" algn="tl" rotWithShape="0">
-                    <a:schemeClr val="bg1">
-                      <a:lumMod val="50000"/>
-                    </a:schemeClr>
-                  </a:outerShdw>
-                </a:effectLst>
-              </a:rPr>
-              <a:t>In-Progress</a:t>
-            </a:r>
-          </a:p>
-        </p:txBody>
-      </p:sp>
     </p:spTree>
     <p:extLst>
       <p:ext uri="{BB962C8B-B14F-4D97-AF65-F5344CB8AC3E}">
@@ -4732,20 +4569,6 @@
               <a:t>Breadcrumbs missing from partner menu</a:t>
             </a:r>
           </a:p>
-          <a:p>
-            <a:pPr lvl="1"/>
-            <a:r>
-              <a:rPr lang="en-US" sz="2400" dirty="0"/>
-              <a:t>Enhancement</a:t>
-            </a:r>
-          </a:p>
-          <a:p>
-            <a:pPr lvl="2"/>
-            <a:r>
-              <a:rPr lang="en-US" sz="2000" dirty="0"/>
-              <a:t>Allow partner to decide if menu is to be displayed at top of screen or included in Sage menu</a:t>
-            </a:r>
-          </a:p>
         </p:txBody>
       </p:sp>
     </p:spTree>
@@ -4795,7 +4618,7 @@
           <a:p>
             <a:r>
               <a:rPr lang="en-US" dirty="0"/>
-              <a:t>Tentative - Customization Wizard Enhancement</a:t>
+              <a:t> Customization Wizard Enhancement</a:t>
             </a:r>
           </a:p>
         </p:txBody>
@@ -4823,14 +4646,14 @@
             <a:pPr lvl="1"/>
             <a:r>
               <a:rPr lang="en-US" sz="2400" dirty="0"/>
-              <a:t>Wizard split into two wizards</a:t>
+              <a:t>Split into two wizards</a:t>
             </a:r>
           </a:p>
           <a:p>
             <a:pPr lvl="1"/>
             <a:r>
               <a:rPr lang="en-US" sz="2400" dirty="0"/>
-              <a:t>First wizard is outside of Visual Studio for customizations not requiring an endpoint</a:t>
+              <a:t>First wizard (standalone) is outside of Visual Studio for customizations not requiring an endpoint</a:t>
             </a:r>
           </a:p>
           <a:p>
@@ -4844,95 +4667,48 @@
             <a:pPr lvl="2"/>
             <a:r>
               <a:rPr lang="en-US" sz="2000" dirty="0"/>
-              <a:t>Inputs for Manifest and XML</a:t>
+              <a:t>Inputs for Manifest and XML via WYSWYG editor</a:t>
             </a:r>
           </a:p>
           <a:p>
             <a:pPr lvl="1"/>
             <a:r>
               <a:rPr lang="en-US" sz="2400" dirty="0"/>
-              <a:t>Second wizard is inside of Visual Studio and accepts JSON Manifest as input</a:t>
+              <a:t>Second wizard (plug-in)is inside of Visual Studio and accepts JSON Manifest as input</a:t>
             </a:r>
           </a:p>
         </p:txBody>
       </p:sp>
       <p:pic>
         <p:nvPicPr>
-          <p:cNvPr id="3" name="Picture 2"/>
+          <p:cNvPr id="2" name="Picture 1">
+            <a:extLst>
+              <a:ext uri="{FF2B5EF4-FFF2-40B4-BE49-F238E27FC236}">
+                <a16:creationId xmlns:a16="http://schemas.microsoft.com/office/drawing/2014/main" id="{24DD28AB-B1BD-495A-A3ED-571CE7357EFA}"/>
+              </a:ext>
+            </a:extLst>
+          </p:cNvPr>
           <p:cNvPicPr>
             <a:picLocks noChangeAspect="1"/>
           </p:cNvPicPr>
           <p:nvPr/>
         </p:nvPicPr>
         <p:blipFill>
-          <a:blip r:embed="rId3" cstate="email">
-            <a:extLst>
-              <a:ext uri="{28A0092B-C50C-407E-A947-70E740481C1C}">
-                <a14:useLocalDpi xmlns:a14="http://schemas.microsoft.com/office/drawing/2010/main"/>
-              </a:ext>
-            </a:extLst>
-          </a:blip>
+          <a:blip r:embed="rId3"/>
           <a:stretch>
             <a:fillRect/>
           </a:stretch>
         </p:blipFill>
         <p:spPr>
           <a:xfrm>
-            <a:off x="5020975" y="1601722"/>
-            <a:ext cx="6985798" cy="4008245"/>
+            <a:off x="5036160" y="1949749"/>
+            <a:ext cx="6730460" cy="4104109"/>
           </a:xfrm>
           <a:prstGeom prst="rect">
             <a:avLst/>
           </a:prstGeom>
         </p:spPr>
       </p:pic>
-      <p:sp>
-        <p:nvSpPr>
-          <p:cNvPr id="6" name="Rectangle 5"/>
-          <p:cNvSpPr/>
-          <p:nvPr/>
-        </p:nvSpPr>
-        <p:spPr>
-          <a:xfrm>
-            <a:off x="814515" y="5686848"/>
-            <a:ext cx="10961473" cy="923330"/>
-          </a:xfrm>
-          <a:prstGeom prst="rect">
-            <a:avLst/>
-          </a:prstGeom>
-          <a:noFill/>
-        </p:spPr>
-        <p:txBody>
-          <a:bodyPr wrap="square" lIns="91440" tIns="45720" rIns="91440" bIns="45720">
-            <a:spAutoFit/>
-          </a:bodyPr>
-          <a:lstStyle/>
-          <a:p>
-            <a:pPr algn="ctr"/>
-            <a:r>
-              <a:rPr lang="en-US" sz="5400" b="1" cap="none" spc="0" dirty="0">
-                <a:ln w="9525">
-                  <a:solidFill>
-                    <a:schemeClr val="bg1"/>
-                  </a:solidFill>
-                  <a:prstDash val="solid"/>
-                </a:ln>
-                <a:solidFill>
-                  <a:srgbClr val="FF0000"/>
-                </a:solidFill>
-                <a:effectLst>
-                  <a:outerShdw blurRad="12700" dist="38100" dir="2700000" algn="tl" rotWithShape="0">
-                    <a:schemeClr val="bg1">
-                      <a:lumMod val="50000"/>
-                    </a:schemeClr>
-                  </a:outerShdw>
-                </a:effectLst>
-              </a:rPr>
-              <a:t>Tentative</a:t>
-            </a:r>
-          </a:p>
-        </p:txBody>
-      </p:sp>
     </p:spTree>
     <p:extLst>
       <p:ext uri="{BB962C8B-B14F-4D97-AF65-F5344CB8AC3E}">

</xml_diff>

<commit_message>
Update screenshot in 2018 slide deck
</commit_message>
<xml_diff>
--- a/docs/presentations/Sage300SDK_2018.0WebSDKOverview.pptx
+++ b/docs/presentations/Sage300SDK_2018.0WebSDKOverview.pptx
@@ -211,7 +211,7 @@
           <a:p>
             <a:fld id="{F8DE098C-C2B2-472C-9728-F51906A9149D}" type="datetimeFigureOut">
               <a:rPr lang="en-US" smtClean="0"/>
-              <a:t>7/12/2017</a:t>
+              <a:t>2017-07-12</a:t>
             </a:fld>
             <a:endParaRPr lang="en-US"/>
           </a:p>
@@ -4318,10 +4318,10 @@
       </p:sp>
       <p:pic>
         <p:nvPicPr>
-          <p:cNvPr id="3" name="Picture 2">
+          <p:cNvPr id="4" name="Picture 3">
             <a:extLst>
               <a:ext uri="{FF2B5EF4-FFF2-40B4-BE49-F238E27FC236}">
-                <a16:creationId xmlns:a16="http://schemas.microsoft.com/office/drawing/2014/main" id="{913C7682-61FD-415F-9B88-F9C7AF4BBAF1}"/>
+                <a16:creationId xmlns:a16="http://schemas.microsoft.com/office/drawing/2014/main" id="{EFEE2D14-D6DE-420B-A733-F371FACF56A9}"/>
               </a:ext>
             </a:extLst>
           </p:cNvPr>
@@ -4331,15 +4331,21 @@
           <p:nvPr/>
         </p:nvPicPr>
         <p:blipFill>
-          <a:blip r:embed="rId3"/>
+          <a:blip r:embed="rId3">
+            <a:extLst>
+              <a:ext uri="{28A0092B-C50C-407E-A947-70E740481C1C}">
+                <a14:useLocalDpi xmlns:a14="http://schemas.microsoft.com/office/drawing/2010/main" val="0"/>
+              </a:ext>
+            </a:extLst>
+          </a:blip>
           <a:stretch>
             <a:fillRect/>
           </a:stretch>
         </p:blipFill>
         <p:spPr>
           <a:xfrm>
-            <a:off x="6823459" y="1366944"/>
-            <a:ext cx="4533900" cy="5257800"/>
+            <a:off x="6458960" y="1200972"/>
+            <a:ext cx="4831499" cy="5174428"/>
           </a:xfrm>
           <a:prstGeom prst="rect">
             <a:avLst/>

</xml_diff>